<commit_message>
I checked in the xlsx file
</commit_message>
<xml_diff>
--- a/doc/GlassTutorial.pptx
+++ b/doc/GlassTutorial.pptx
@@ -294,7 +294,7 @@
           <a:p>
             <a:fld id="{5C4B42A9-3A53-8144-A15F-4B93379B65B1}" type="datetimeFigureOut">
               <a:rPr lang="en-US" smtClean="0"/>
-              <a:t>9/11/13</a:t>
+              <a:t>9/12/13</a:t>
             </a:fld>
             <a:endParaRPr lang="en-US"/>
           </a:p>
@@ -464,7 +464,7 @@
           <a:p>
             <a:fld id="{5C4B42A9-3A53-8144-A15F-4B93379B65B1}" type="datetimeFigureOut">
               <a:rPr lang="en-US" smtClean="0"/>
-              <a:t>9/11/13</a:t>
+              <a:t>9/12/13</a:t>
             </a:fld>
             <a:endParaRPr lang="en-US"/>
           </a:p>
@@ -644,7 +644,7 @@
           <a:p>
             <a:fld id="{5C4B42A9-3A53-8144-A15F-4B93379B65B1}" type="datetimeFigureOut">
               <a:rPr lang="en-US" smtClean="0"/>
-              <a:t>9/11/13</a:t>
+              <a:t>9/12/13</a:t>
             </a:fld>
             <a:endParaRPr lang="en-US"/>
           </a:p>
@@ -814,7 +814,7 @@
           <a:p>
             <a:fld id="{5C4B42A9-3A53-8144-A15F-4B93379B65B1}" type="datetimeFigureOut">
               <a:rPr lang="en-US" smtClean="0"/>
-              <a:t>9/11/13</a:t>
+              <a:t>9/12/13</a:t>
             </a:fld>
             <a:endParaRPr lang="en-US"/>
           </a:p>
@@ -1060,7 +1060,7 @@
           <a:p>
             <a:fld id="{5C4B42A9-3A53-8144-A15F-4B93379B65B1}" type="datetimeFigureOut">
               <a:rPr lang="en-US" smtClean="0"/>
-              <a:t>9/11/13</a:t>
+              <a:t>9/12/13</a:t>
             </a:fld>
             <a:endParaRPr lang="en-US"/>
           </a:p>
@@ -1348,7 +1348,7 @@
           <a:p>
             <a:fld id="{5C4B42A9-3A53-8144-A15F-4B93379B65B1}" type="datetimeFigureOut">
               <a:rPr lang="en-US" smtClean="0"/>
-              <a:t>9/11/13</a:t>
+              <a:t>9/12/13</a:t>
             </a:fld>
             <a:endParaRPr lang="en-US"/>
           </a:p>
@@ -1770,7 +1770,7 @@
           <a:p>
             <a:fld id="{5C4B42A9-3A53-8144-A15F-4B93379B65B1}" type="datetimeFigureOut">
               <a:rPr lang="en-US" smtClean="0"/>
-              <a:t>9/11/13</a:t>
+              <a:t>9/12/13</a:t>
             </a:fld>
             <a:endParaRPr lang="en-US"/>
           </a:p>
@@ -1888,7 +1888,7 @@
           <a:p>
             <a:fld id="{5C4B42A9-3A53-8144-A15F-4B93379B65B1}" type="datetimeFigureOut">
               <a:rPr lang="en-US" smtClean="0"/>
-              <a:t>9/11/13</a:t>
+              <a:t>9/12/13</a:t>
             </a:fld>
             <a:endParaRPr lang="en-US"/>
           </a:p>
@@ -1983,7 +1983,7 @@
           <a:p>
             <a:fld id="{5C4B42A9-3A53-8144-A15F-4B93379B65B1}" type="datetimeFigureOut">
               <a:rPr lang="en-US" smtClean="0"/>
-              <a:t>9/11/13</a:t>
+              <a:t>9/12/13</a:t>
             </a:fld>
             <a:endParaRPr lang="en-US"/>
           </a:p>
@@ -2260,7 +2260,7 @@
           <a:p>
             <a:fld id="{5C4B42A9-3A53-8144-A15F-4B93379B65B1}" type="datetimeFigureOut">
               <a:rPr lang="en-US" smtClean="0"/>
-              <a:t>9/11/13</a:t>
+              <a:t>9/12/13</a:t>
             </a:fld>
             <a:endParaRPr lang="en-US"/>
           </a:p>
@@ -2513,7 +2513,7 @@
           <a:p>
             <a:fld id="{5C4B42A9-3A53-8144-A15F-4B93379B65B1}" type="datetimeFigureOut">
               <a:rPr lang="en-US" smtClean="0"/>
-              <a:t>9/11/13</a:t>
+              <a:t>9/12/13</a:t>
             </a:fld>
             <a:endParaRPr lang="en-US"/>
           </a:p>
@@ -2726,7 +2726,7 @@
           <a:p>
             <a:fld id="{5C4B42A9-3A53-8144-A15F-4B93379B65B1}" type="datetimeFigureOut">
               <a:rPr lang="en-US" smtClean="0"/>
-              <a:t>9/11/13</a:t>
+              <a:t>9/12/13</a:t>
             </a:fld>
             <a:endParaRPr lang="en-US"/>
           </a:p>
@@ -3187,14 +3187,7 @@
                 <a:latin typeface="Segoe Light"/>
                 <a:cs typeface="Segoe Light"/>
               </a:rPr>
-              <a:t>Single </a:t>
-            </a:r>
-            <a:r>
-              <a:rPr lang="en-US" dirty="0" smtClean="0">
-                <a:latin typeface="Segoe Light"/>
-                <a:cs typeface="Segoe Light"/>
-              </a:rPr>
-              <a:t>Tap</a:t>
+              <a:t>Single Tap</a:t>
             </a:r>
             <a:endParaRPr lang="en-US" dirty="0"/>
           </a:p>

</xml_diff>